<commit_message>
Presentation error correction (container)
</commit_message>
<xml_diff>
--- a/Documents/Schlusspräsentation/Schlussbericht_Präsentation_v1.pptx
+++ b/Documents/Schlusspräsentation/Schlussbericht_Präsentation_v1.pptx
@@ -4136,24 +4136,16 @@
           <a:p>
             <a:r>
               <a:rPr lang="de-CH" dirty="0" smtClean="0"/>
-              <a:t>Quick </a:t>
-            </a:r>
+              <a:t>Quick Game</a:t>
+            </a:r>
+          </a:p>
+          <a:p>
+            <a:endParaRPr lang="de-CH" dirty="0" smtClean="0"/>
+          </a:p>
+          <a:p>
             <a:r>
               <a:rPr lang="de-CH" dirty="0" smtClean="0"/>
-              <a:t>Game</a:t>
-            </a:r>
-          </a:p>
-          <a:p>
-            <a:endParaRPr lang="de-CH" dirty="0" smtClean="0"/>
-          </a:p>
-          <a:p>
-            <a:r>
-              <a:rPr lang="de-CH" dirty="0" smtClean="0"/>
-              <a:t>Career </a:t>
-            </a:r>
-            <a:r>
-              <a:rPr lang="de-CH" dirty="0" smtClean="0"/>
-              <a:t>Game</a:t>
+              <a:t>Career Game</a:t>
             </a:r>
           </a:p>
           <a:p>
@@ -4189,7 +4181,7 @@
         </p:blipFill>
         <p:spPr>
           <a:xfrm>
-            <a:off x="4376818" y="3981271"/>
+            <a:off x="4384040" y="1788941"/>
             <a:ext cx="1440000" cy="720000"/>
           </a:xfrm>
           <a:prstGeom prst="rect">
@@ -4229,7 +4221,7 @@
       </p:pic>
       <p:pic>
         <p:nvPicPr>
-          <p:cNvPr id="8" name="Grafik 7"/>
+          <p:cNvPr id="9" name="Grafik 8"/>
           <p:cNvPicPr>
             <a:picLocks noChangeAspect="1"/>
           </p:cNvPicPr>
@@ -4249,7 +4241,7 @@
         </p:blipFill>
         <p:spPr>
           <a:xfrm>
-            <a:off x="4384040" y="1788941"/>
+            <a:off x="4376757" y="3981271"/>
             <a:ext cx="1440000" cy="720000"/>
           </a:xfrm>
           <a:prstGeom prst="rect">
@@ -4318,33 +4310,6 @@
                                   </p:childTnLst>
                                 </p:cTn>
                               </p:par>
-                              <p:par>
-                                <p:cTn id="7" presetID="1" presetClass="entr" presetSubtype="0" fill="hold" nodeType="withEffect">
-                                  <p:stCondLst>
-                                    <p:cond delay="0"/>
-                                  </p:stCondLst>
-                                  <p:childTnLst>
-                                    <p:set>
-                                      <p:cBhvr>
-                                        <p:cTn id="8" dur="1" fill="hold">
-                                          <p:stCondLst>
-                                            <p:cond delay="0"/>
-                                          </p:stCondLst>
-                                        </p:cTn>
-                                        <p:tgtEl>
-                                          <p:spTgt spid="8"/>
-                                        </p:tgtEl>
-                                        <p:attrNameLst>
-                                          <p:attrName>style.visibility</p:attrName>
-                                        </p:attrNameLst>
-                                      </p:cBhvr>
-                                      <p:to>
-                                        <p:strVal val="visible"/>
-                                      </p:to>
-                                    </p:set>
-                                  </p:childTnLst>
-                                </p:cTn>
-                              </p:par>
                             </p:childTnLst>
                           </p:cTn>
                         </p:par>
@@ -4352,26 +4317,26 @@
                     </p:cTn>
                   </p:par>
                   <p:par>
-                    <p:cTn id="9" fill="hold">
+                    <p:cTn id="7" fill="hold">
                       <p:stCondLst>
                         <p:cond delay="indefinite"/>
                       </p:stCondLst>
                       <p:childTnLst>
                         <p:par>
-                          <p:cTn id="10" fill="hold">
+                          <p:cTn id="8" fill="hold">
                             <p:stCondLst>
                               <p:cond delay="0"/>
                             </p:stCondLst>
                             <p:childTnLst>
                               <p:par>
-                                <p:cTn id="11" presetID="1" presetClass="entr" presetSubtype="0" fill="hold" nodeType="clickEffect">
+                                <p:cTn id="9" presetID="1" presetClass="entr" presetSubtype="0" fill="hold" nodeType="clickEffect">
                                   <p:stCondLst>
                                     <p:cond delay="0"/>
                                   </p:stCondLst>
                                   <p:childTnLst>
                                     <p:set>
                                       <p:cBhvr>
-                                        <p:cTn id="12" dur="1" fill="hold">
+                                        <p:cTn id="10" dur="1" fill="hold">
                                           <p:stCondLst>
                                             <p:cond delay="0"/>
                                           </p:stCondLst>
@@ -4395,14 +4360,14 @@
                                 </p:cTn>
                               </p:par>
                               <p:par>
-                                <p:cTn id="13" presetID="1" presetClass="entr" presetSubtype="0" fill="hold" nodeType="withEffect">
+                                <p:cTn id="11" presetID="1" presetClass="entr" presetSubtype="0" fill="hold" nodeType="withEffect">
                                   <p:stCondLst>
                                     <p:cond delay="0"/>
                                   </p:stCondLst>
                                   <p:childTnLst>
                                     <p:set>
                                       <p:cBhvr>
-                                        <p:cTn id="14" dur="1" fill="hold">
+                                        <p:cTn id="12" dur="1" fill="hold">
                                           <p:stCondLst>
                                             <p:cond delay="0"/>
                                           </p:stCondLst>
@@ -4428,19 +4393,50 @@
                     </p:cTn>
                   </p:par>
                   <p:par>
-                    <p:cTn id="15" fill="hold">
+                    <p:cTn id="13" fill="hold">
                       <p:stCondLst>
                         <p:cond delay="indefinite"/>
                       </p:stCondLst>
                       <p:childTnLst>
                         <p:par>
-                          <p:cTn id="16" fill="hold">
+                          <p:cTn id="14" fill="hold">
                             <p:stCondLst>
                               <p:cond delay="0"/>
                             </p:stCondLst>
                             <p:childTnLst>
                               <p:par>
-                                <p:cTn id="17" presetID="1" presetClass="entr" presetSubtype="0" fill="hold" nodeType="clickEffect">
+                                <p:cTn id="15" presetID="1" presetClass="entr" presetSubtype="0" fill="hold" nodeType="clickEffect">
+                                  <p:stCondLst>
+                                    <p:cond delay="0"/>
+                                  </p:stCondLst>
+                                  <p:childTnLst>
+                                    <p:set>
+                                      <p:cBhvr>
+                                        <p:cTn id="16" dur="1" fill="hold">
+                                          <p:stCondLst>
+                                            <p:cond delay="0"/>
+                                          </p:stCondLst>
+                                        </p:cTn>
+                                        <p:tgtEl>
+                                          <p:spTgt spid="5">
+                                            <p:txEl>
+                                              <p:pRg st="5" end="5"/>
+                                            </p:txEl>
+                                          </p:spTgt>
+                                        </p:tgtEl>
+                                        <p:attrNameLst>
+                                          <p:attrName>style.visibility</p:attrName>
+                                        </p:attrNameLst>
+                                      </p:cBhvr>
+                                      <p:to>
+                                        <p:strVal val="visible"/>
+                                      </p:to>
+                                    </p:set>
+                                  </p:childTnLst>
+                                </p:cTn>
+                              </p:par>
+                              <p:par>
+                                <p:cTn id="17" presetID="1" presetClass="entr" presetSubtype="0" fill="hold" nodeType="withEffect">
                                   <p:stCondLst>
                                     <p:cond delay="0"/>
                                   </p:stCondLst>
@@ -4453,11 +4449,7 @@
                                           </p:stCondLst>
                                         </p:cTn>
                                         <p:tgtEl>
-                                          <p:spTgt spid="5">
-                                            <p:txEl>
-                                              <p:pRg st="5" end="5"/>
-                                            </p:txEl>
-                                          </p:spTgt>
+                                          <p:spTgt spid="6"/>
                                         </p:tgtEl>
                                         <p:attrNameLst>
                                           <p:attrName>style.visibility</p:attrName>
@@ -4484,7 +4476,7 @@
                                           </p:stCondLst>
                                         </p:cTn>
                                         <p:tgtEl>
-                                          <p:spTgt spid="6"/>
+                                          <p:spTgt spid="9"/>
                                         </p:tgtEl>
                                         <p:attrNameLst>
                                           <p:attrName>style.visibility</p:attrName>

</xml_diff>

<commit_message>
Soundeffekte bei geplanten erweiterungen eingefüght
</commit_message>
<xml_diff>
--- a/Documents/Schlusspräsentation/Schlussbericht_Präsentation_v1.pptx
+++ b/Documents/Schlusspräsentation/Schlussbericht_Präsentation_v1.pptx
@@ -124,7 +124,7 @@
   </p:defaultTextStyle>
   <p:extLst>
     <p:ext uri="{EFAFB233-063F-42B5-8137-9DF3F51BA10A}">
-      <p15:sldGuideLst xmlns:p15="http://schemas.microsoft.com/office/powerpoint/2012/main" xmlns="">
+      <p15:sldGuideLst xmlns="" xmlns:p15="http://schemas.microsoft.com/office/powerpoint/2012/main">
         <p15:guide id="1" orient="horz" pos="2160">
           <p15:clr>
             <a:srgbClr val="A4A3A4"/>
@@ -138,7 +138,7 @@
       </p15:sldGuideLst>
     </p:ext>
     <p:ext uri="{2D200454-40CA-4A62-9FC3-DE9A4176ACB9}">
-      <p15:notesGuideLst xmlns:p15="http://schemas.microsoft.com/office/powerpoint/2012/main" xmlns=""/>
+      <p15:notesGuideLst xmlns="" xmlns:p15="http://schemas.microsoft.com/office/powerpoint/2012/main"/>
     </p:ext>
   </p:extLst>
 </p:presentation>
@@ -6428,6 +6428,16 @@
             </a:r>
             <a:endParaRPr lang="de-CH" dirty="0" smtClean="0"/>
           </a:p>
+          <a:p>
+            <a:endParaRPr lang="de-CH" dirty="0"/>
+          </a:p>
+          <a:p>
+            <a:r>
+              <a:rPr lang="de-CH" smtClean="0"/>
+              <a:t>Neue Soundeffekte</a:t>
+            </a:r>
+            <a:endParaRPr lang="de-CH" dirty="0" smtClean="0"/>
+          </a:p>
         </p:txBody>
       </p:sp>
       <p:pic>
@@ -6536,6 +6546,47 @@
         <p:spPr bwMode="auto">
           <a:xfrm>
             <a:off x="5919681" y="3944473"/>
+            <a:ext cx="1459509" cy="729937"/>
+          </a:xfrm>
+          <a:prstGeom prst="rect">
+            <a:avLst/>
+          </a:prstGeom>
+          <a:noFill/>
+          <a:extLst>
+            <a:ext uri="{909E8E84-426E-40DD-AFC4-6F175D3DCCD1}">
+              <a14:hiddenFill xmlns:a14="http://schemas.microsoft.com/office/drawing/2010/main">
+                <a:solidFill>
+                  <a:srgbClr val="FFFFFF"/>
+                </a:solidFill>
+              </a14:hiddenFill>
+            </a:ext>
+          </a:extLst>
+        </p:spPr>
+      </p:pic>
+      <p:pic>
+        <p:nvPicPr>
+          <p:cNvPr id="2" name="Picture 2" descr="C:\Users\ChrisMagic\Dropbox\Workspace\squarefeed\Documents\Schlusspräsentation\containerbildli für remo\sounds.png"/>
+          <p:cNvPicPr>
+            <a:picLocks noChangeAspect="1" noChangeArrowheads="1"/>
+          </p:cNvPicPr>
+          <p:nvPr/>
+        </p:nvPicPr>
+        <p:blipFill>
+          <a:blip r:embed="rId5" cstate="print">
+            <a:extLst>
+              <a:ext uri="{28A0092B-C50C-407E-A947-70E740481C1C}">
+                <a14:useLocalDpi xmlns:a14="http://schemas.microsoft.com/office/drawing/2010/main" val="0"/>
+              </a:ext>
+            </a:extLst>
+          </a:blip>
+          <a:srcRect/>
+          <a:stretch>
+            <a:fillRect/>
+          </a:stretch>
+        </p:blipFill>
+        <p:spPr bwMode="auto">
+          <a:xfrm>
+            <a:off x="5919682" y="5013176"/>
             <a:ext cx="1459509" cy="729937"/>
           </a:xfrm>
           <a:prstGeom prst="rect">
@@ -6698,6 +6749,55 @@
                                           <p:spTgt spid="5">
                                             <p:txEl>
                                               <p:pRg st="5" end="5"/>
+                                            </p:txEl>
+                                          </p:spTgt>
+                                        </p:tgtEl>
+                                        <p:attrNameLst>
+                                          <p:attrName>style.visibility</p:attrName>
+                                        </p:attrNameLst>
+                                      </p:cBhvr>
+                                      <p:to>
+                                        <p:strVal val="visible"/>
+                                      </p:to>
+                                    </p:set>
+                                  </p:childTnLst>
+                                </p:cTn>
+                              </p:par>
+                            </p:childTnLst>
+                          </p:cTn>
+                        </p:par>
+                      </p:childTnLst>
+                    </p:cTn>
+                  </p:par>
+                  <p:par>
+                    <p:cTn id="15" fill="hold">
+                      <p:stCondLst>
+                        <p:cond delay="indefinite"/>
+                      </p:stCondLst>
+                      <p:childTnLst>
+                        <p:par>
+                          <p:cTn id="16" fill="hold">
+                            <p:stCondLst>
+                              <p:cond delay="0"/>
+                            </p:stCondLst>
+                            <p:childTnLst>
+                              <p:par>
+                                <p:cTn id="17" presetID="1" presetClass="entr" presetSubtype="0" fill="hold" nodeType="clickEffect">
+                                  <p:stCondLst>
+                                    <p:cond delay="0"/>
+                                  </p:stCondLst>
+                                  <p:childTnLst>
+                                    <p:set>
+                                      <p:cBhvr>
+                                        <p:cTn id="18" dur="1" fill="hold">
+                                          <p:stCondLst>
+                                            <p:cond delay="0"/>
+                                          </p:stCondLst>
+                                        </p:cTn>
+                                        <p:tgtEl>
+                                          <p:spTgt spid="5">
+                                            <p:txEl>
+                                              <p:pRg st="7" end="7"/>
                                             </p:txEl>
                                           </p:spTgt>
                                         </p:tgtEl>
@@ -7573,7 +7673,7 @@
   <a:extraClrSchemeLst/>
   <a:extLst>
     <a:ext uri="{05A4C25C-085E-4340-85A3-A5531E510DB2}">
-      <thm15:themeFamily xmlns:thm15="http://schemas.microsoft.com/office/thememl/2012/main" xmlns="" name="Office Theme" id="{62F939B6-93AF-4DB8-9C6B-D6C7DFDC589F}" vid="{4A3C46E8-61CC-4603-A589-7422A47A8E4A}"/>
+      <thm15:themeFamily xmlns="" xmlns:thm15="http://schemas.microsoft.com/office/thememl/2012/main" name="Office Theme" id="{62F939B6-93AF-4DB8-9C6B-D6C7DFDC589F}" vid="{4A3C46E8-61CC-4603-A589-7422A47A8E4A}"/>
     </a:ext>
   </a:extLst>
 </a:theme>

</xml_diff>